<commit_message>
update the information of transmission
</commit_message>
<xml_diff>
--- a/Dance invaders.pptx
+++ b/Dance invaders.pptx
@@ -114,6 +114,11 @@
       </a:defRPr>
     </a:lvl9pPr>
   </p:defaultTextStyle>
+  <p:extLst>
+    <p:ext uri="{EFAFB233-063F-42B5-8137-9DF3F51BA10A}">
+      <p15:sldGuideLst xmlns:p15="http://schemas.microsoft.com/office/powerpoint/2012/main"/>
+    </p:ext>
+  </p:extLst>
 </p:presentation>
 </file>
 
@@ -287,7 +292,7 @@
           <a:p>
             <a:fld id="{48A87A34-81AB-432B-8DAE-1953F412C126}" type="datetimeFigureOut">
               <a:rPr lang="en-US" dirty="0"/>
-              <a:t>1/9/2021</a:t>
+              <a:t>1/10/2021</a:t>
             </a:fld>
             <a:endParaRPr lang="en-US" dirty="0"/>
           </a:p>
@@ -549,7 +554,7 @@
           <a:p>
             <a:fld id="{48A87A34-81AB-432B-8DAE-1953F412C126}" type="datetimeFigureOut">
               <a:rPr lang="en-US" dirty="0"/>
-              <a:t>1/9/2021</a:t>
+              <a:t>1/10/2021</a:t>
             </a:fld>
             <a:endParaRPr lang="en-US" dirty="0"/>
           </a:p>
@@ -776,7 +781,7 @@
             <a:fld id="{48A87A34-81AB-432B-8DAE-1953F412C126}" type="datetimeFigureOut">
               <a:rPr lang="en-US" dirty="0"/>
               <a:pPr/>
-              <a:t>1/9/2021</a:t>
+              <a:t>1/10/2021</a:t>
             </a:fld>
             <a:endParaRPr lang="en-US" dirty="0"/>
           </a:p>
@@ -1082,7 +1087,7 @@
             <a:fld id="{48A87A34-81AB-432B-8DAE-1953F412C126}" type="datetimeFigureOut">
               <a:rPr lang="en-US" dirty="0"/>
               <a:pPr/>
-              <a:t>1/9/2021</a:t>
+              <a:t>1/10/2021</a:t>
             </a:fld>
             <a:endParaRPr lang="en-US" dirty="0"/>
           </a:p>
@@ -1551,7 +1556,7 @@
             <a:fld id="{48A87A34-81AB-432B-8DAE-1953F412C126}" type="datetimeFigureOut">
               <a:rPr lang="en-US" dirty="0"/>
               <a:pPr/>
-              <a:t>1/9/2021</a:t>
+              <a:t>1/10/2021</a:t>
             </a:fld>
             <a:endParaRPr lang="en-US" dirty="0"/>
           </a:p>
@@ -2093,7 +2098,7 @@
           <a:p>
             <a:fld id="{48A87A34-81AB-432B-8DAE-1953F412C126}" type="datetimeFigureOut">
               <a:rPr lang="en-US" dirty="0"/>
-              <a:t>1/9/2021</a:t>
+              <a:t>1/10/2021</a:t>
             </a:fld>
             <a:endParaRPr lang="en-US" dirty="0"/>
           </a:p>
@@ -2862,7 +2867,7 @@
           <a:p>
             <a:fld id="{48A87A34-81AB-432B-8DAE-1953F412C126}" type="datetimeFigureOut">
               <a:rPr lang="en-US" dirty="0"/>
-              <a:t>1/9/2021</a:t>
+              <a:t>1/10/2021</a:t>
             </a:fld>
             <a:endParaRPr lang="en-US" dirty="0"/>
           </a:p>
@@ -3032,7 +3037,7 @@
           <a:p>
             <a:fld id="{48A87A34-81AB-432B-8DAE-1953F412C126}" type="datetimeFigureOut">
               <a:rPr lang="en-US" dirty="0"/>
-              <a:t>1/9/2021</a:t>
+              <a:t>1/10/2021</a:t>
             </a:fld>
             <a:endParaRPr lang="en-US" dirty="0"/>
           </a:p>
@@ -3251,7 +3256,7 @@
             <a:fld id="{48A87A34-81AB-432B-8DAE-1953F412C126}" type="datetimeFigureOut">
               <a:rPr lang="en-US" dirty="0"/>
               <a:pPr/>
-              <a:t>1/9/2021</a:t>
+              <a:t>1/10/2021</a:t>
             </a:fld>
             <a:endParaRPr lang="en-US" dirty="0"/>
           </a:p>
@@ -3426,7 +3431,7 @@
           <a:p>
             <a:fld id="{48A87A34-81AB-432B-8DAE-1953F412C126}" type="datetimeFigureOut">
               <a:rPr lang="en-US" dirty="0"/>
-              <a:t>1/9/2021</a:t>
+              <a:t>1/10/2021</a:t>
             </a:fld>
             <a:endParaRPr lang="en-US" dirty="0"/>
           </a:p>
@@ -3711,7 +3716,7 @@
             <a:fld id="{48A87A34-81AB-432B-8DAE-1953F412C126}" type="datetimeFigureOut">
               <a:rPr lang="en-US" dirty="0"/>
               <a:pPr/>
-              <a:t>1/9/2021</a:t>
+              <a:t>1/10/2021</a:t>
             </a:fld>
             <a:endParaRPr lang="en-US" dirty="0"/>
           </a:p>
@@ -3948,7 +3953,7 @@
           <a:p>
             <a:fld id="{48A87A34-81AB-432B-8DAE-1953F412C126}" type="datetimeFigureOut">
               <a:rPr lang="en-US" dirty="0"/>
-              <a:t>1/9/2021</a:t>
+              <a:t>1/10/2021</a:t>
             </a:fld>
             <a:endParaRPr lang="en-US" dirty="0"/>
           </a:p>
@@ -4322,7 +4327,7 @@
           <a:p>
             <a:fld id="{48A87A34-81AB-432B-8DAE-1953F412C126}" type="datetimeFigureOut">
               <a:rPr lang="en-US" dirty="0"/>
-              <a:t>1/9/2021</a:t>
+              <a:t>1/10/2021</a:t>
             </a:fld>
             <a:endParaRPr lang="en-US" dirty="0"/>
           </a:p>
@@ -4435,7 +4440,7 @@
           <a:p>
             <a:fld id="{48A87A34-81AB-432B-8DAE-1953F412C126}" type="datetimeFigureOut">
               <a:rPr lang="en-US" dirty="0"/>
-              <a:t>1/9/2021</a:t>
+              <a:t>1/10/2021</a:t>
             </a:fld>
             <a:endParaRPr lang="en-US" dirty="0"/>
           </a:p>
@@ -4525,7 +4530,7 @@
           <a:p>
             <a:fld id="{48A87A34-81AB-432B-8DAE-1953F412C126}" type="datetimeFigureOut">
               <a:rPr lang="en-US" dirty="0"/>
-              <a:t>1/9/2021</a:t>
+              <a:t>1/10/2021</a:t>
             </a:fld>
             <a:endParaRPr lang="en-US" dirty="0"/>
           </a:p>
@@ -4769,7 +4774,7 @@
           <a:p>
             <a:fld id="{48A87A34-81AB-432B-8DAE-1953F412C126}" type="datetimeFigureOut">
               <a:rPr lang="en-US" dirty="0"/>
-              <a:t>1/9/2021</a:t>
+              <a:t>1/10/2021</a:t>
             </a:fld>
             <a:endParaRPr lang="en-US" dirty="0"/>
           </a:p>
@@ -5021,7 +5026,7 @@
           <a:p>
             <a:fld id="{48A87A34-81AB-432B-8DAE-1953F412C126}" type="datetimeFigureOut">
               <a:rPr lang="en-US" dirty="0"/>
-              <a:t>1/9/2021</a:t>
+              <a:t>1/10/2021</a:t>
             </a:fld>
             <a:endParaRPr lang="en-US" dirty="0"/>
           </a:p>
@@ -5260,7 +5265,7 @@
             <a:fld id="{48A87A34-81AB-432B-8DAE-1953F412C126}" type="datetimeFigureOut">
               <a:rPr lang="en-US" dirty="0"/>
               <a:pPr/>
-              <a:t>1/9/2021</a:t>
+              <a:t>1/10/2021</a:t>
             </a:fld>
             <a:endParaRPr lang="en-US" dirty="0"/>
           </a:p>
@@ -6346,10 +6351,28 @@
         </p:nvSpPr>
         <p:spPr/>
         <p:txBody>
-          <a:bodyPr/>
-          <a:lstStyle/>
-          <a:p>
-            <a:endParaRPr lang="zh-TW" altLang="en-US" dirty="0"/>
+          <a:bodyPr>
+            <a:normAutofit/>
+          </a:bodyPr>
+          <a:lstStyle/>
+          <a:p>
+            <a:r>
+              <a:rPr lang="en-US" altLang="zh-TW" sz="2800" dirty="0"/>
+              <a:t>We use 4-bit-unit serial transmission by asynchronous handshaking, and the transmission is unidirectional.</a:t>
+            </a:r>
+          </a:p>
+          <a:p>
+            <a:r>
+              <a:rPr lang="en-US" altLang="zh-TW" sz="2800" dirty="0"/>
+              <a:t>The most difficult point is the protocol between mother board and child board , including the size of an object and the way to transmit the object.</a:t>
+            </a:r>
+          </a:p>
+          <a:p>
+            <a:r>
+              <a:rPr lang="en-US" altLang="zh-TW" sz="2800" dirty="0"/>
+              <a:t>We use the reset signal from mother board to child board to reset child board , and we use odd parity to detect the error.</a:t>
+            </a:r>
+            <a:endParaRPr lang="zh-TW" altLang="en-US" sz="2800" dirty="0"/>
           </a:p>
         </p:txBody>
       </p:sp>

</xml_diff>